<commit_message>
added new tree draft and updated slides
</commit_message>
<xml_diff>
--- a/workshops/2019_11_06/Präsentation 06_11_2019.pptx
+++ b/workshops/2019_11_06/Präsentation 06_11_2019.pptx
@@ -204,7 +204,7 @@
           <a:p>
             <a:fld id="{E3599E8E-A991-475F-AF77-DE09EB48F9ED}" type="datetimeFigureOut">
               <a:rPr lang="de-DE" smtClean="0"/>
-              <a:t>04.11.2019</a:t>
+              <a:t>05.11.2019</a:t>
             </a:fld>
             <a:endParaRPr lang="de-DE"/>
           </a:p>
@@ -1227,7 +1227,7 @@
           <a:p>
             <a:fld id="{1DFF6629-E111-4711-A1D3-7DE9729EAF6D}" type="datetimeFigureOut">
               <a:rPr lang="de-DE" smtClean="0"/>
-              <a:t>04.11.2019</a:t>
+              <a:t>05.11.2019</a:t>
             </a:fld>
             <a:endParaRPr lang="de-DE"/>
           </a:p>
@@ -1425,7 +1425,7 @@
           <a:p>
             <a:fld id="{1DFF6629-E111-4711-A1D3-7DE9729EAF6D}" type="datetimeFigureOut">
               <a:rPr lang="de-DE" smtClean="0"/>
-              <a:t>04.11.2019</a:t>
+              <a:t>05.11.2019</a:t>
             </a:fld>
             <a:endParaRPr lang="de-DE"/>
           </a:p>
@@ -1633,7 +1633,7 @@
           <a:p>
             <a:fld id="{1DFF6629-E111-4711-A1D3-7DE9729EAF6D}" type="datetimeFigureOut">
               <a:rPr lang="de-DE" smtClean="0"/>
-              <a:t>04.11.2019</a:t>
+              <a:t>05.11.2019</a:t>
             </a:fld>
             <a:endParaRPr lang="de-DE"/>
           </a:p>
@@ -1831,7 +1831,7 @@
           <a:p>
             <a:fld id="{1DFF6629-E111-4711-A1D3-7DE9729EAF6D}" type="datetimeFigureOut">
               <a:rPr lang="de-DE" smtClean="0"/>
-              <a:t>04.11.2019</a:t>
+              <a:t>05.11.2019</a:t>
             </a:fld>
             <a:endParaRPr lang="de-DE"/>
           </a:p>
@@ -2106,7 +2106,7 @@
           <a:p>
             <a:fld id="{1DFF6629-E111-4711-A1D3-7DE9729EAF6D}" type="datetimeFigureOut">
               <a:rPr lang="de-DE" smtClean="0"/>
-              <a:t>04.11.2019</a:t>
+              <a:t>05.11.2019</a:t>
             </a:fld>
             <a:endParaRPr lang="de-DE"/>
           </a:p>
@@ -2371,7 +2371,7 @@
           <a:p>
             <a:fld id="{1DFF6629-E111-4711-A1D3-7DE9729EAF6D}" type="datetimeFigureOut">
               <a:rPr lang="de-DE" smtClean="0"/>
-              <a:t>04.11.2019</a:t>
+              <a:t>05.11.2019</a:t>
             </a:fld>
             <a:endParaRPr lang="de-DE"/>
           </a:p>
@@ -2783,7 +2783,7 @@
           <a:p>
             <a:fld id="{1DFF6629-E111-4711-A1D3-7DE9729EAF6D}" type="datetimeFigureOut">
               <a:rPr lang="de-DE" smtClean="0"/>
-              <a:t>04.11.2019</a:t>
+              <a:t>05.11.2019</a:t>
             </a:fld>
             <a:endParaRPr lang="de-DE"/>
           </a:p>
@@ -2924,7 +2924,7 @@
           <a:p>
             <a:fld id="{1DFF6629-E111-4711-A1D3-7DE9729EAF6D}" type="datetimeFigureOut">
               <a:rPr lang="de-DE" smtClean="0"/>
-              <a:t>04.11.2019</a:t>
+              <a:t>05.11.2019</a:t>
             </a:fld>
             <a:endParaRPr lang="de-DE"/>
           </a:p>
@@ -3037,7 +3037,7 @@
           <a:p>
             <a:fld id="{1DFF6629-E111-4711-A1D3-7DE9729EAF6D}" type="datetimeFigureOut">
               <a:rPr lang="de-DE" smtClean="0"/>
-              <a:t>04.11.2019</a:t>
+              <a:t>05.11.2019</a:t>
             </a:fld>
             <a:endParaRPr lang="de-DE"/>
           </a:p>
@@ -3348,7 +3348,7 @@
           <a:p>
             <a:fld id="{1DFF6629-E111-4711-A1D3-7DE9729EAF6D}" type="datetimeFigureOut">
               <a:rPr lang="de-DE" smtClean="0"/>
-              <a:t>04.11.2019</a:t>
+              <a:t>05.11.2019</a:t>
             </a:fld>
             <a:endParaRPr lang="de-DE"/>
           </a:p>
@@ -3636,7 +3636,7 @@
           <a:p>
             <a:fld id="{1DFF6629-E111-4711-A1D3-7DE9729EAF6D}" type="datetimeFigureOut">
               <a:rPr lang="de-DE" smtClean="0"/>
-              <a:t>04.11.2019</a:t>
+              <a:t>05.11.2019</a:t>
             </a:fld>
             <a:endParaRPr lang="de-DE"/>
           </a:p>
@@ -3886,7 +3886,7 @@
           <a:p>
             <a:fld id="{1DFF6629-E111-4711-A1D3-7DE9729EAF6D}" type="datetimeFigureOut">
               <a:rPr lang="de-DE" smtClean="0"/>
-              <a:t>04.11.2019</a:t>
+              <a:t>05.11.2019</a:t>
             </a:fld>
             <a:endParaRPr lang="de-DE"/>
           </a:p>
@@ -5132,6 +5132,42 @@
           </a:p>
         </p:txBody>
       </p:sp>
+      <p:pic>
+        <p:nvPicPr>
+          <p:cNvPr id="6" name="Picture 5">
+            <a:extLst>
+              <a:ext uri="{FF2B5EF4-FFF2-40B4-BE49-F238E27FC236}">
+                <a16:creationId xmlns:a16="http://schemas.microsoft.com/office/drawing/2014/main" id="{19D12E30-1930-4B14-8022-4ABACFFD40B2}"/>
+              </a:ext>
+            </a:extLst>
+          </p:cNvPr>
+          <p:cNvPicPr>
+            <a:picLocks noChangeAspect="1"/>
+          </p:cNvPicPr>
+          <p:nvPr/>
+        </p:nvPicPr>
+        <p:blipFill>
+          <a:blip r:embed="rId3">
+            <a:extLst>
+              <a:ext uri="{28A0092B-C50C-407E-A947-70E740481C1C}">
+                <a14:useLocalDpi xmlns:a14="http://schemas.microsoft.com/office/drawing/2010/main" val="0"/>
+              </a:ext>
+            </a:extLst>
+          </a:blip>
+          <a:stretch>
+            <a:fillRect/>
+          </a:stretch>
+        </p:blipFill>
+        <p:spPr>
+          <a:xfrm>
+            <a:off x="4560938" y="1027906"/>
+            <a:ext cx="6589144" cy="5650884"/>
+          </a:xfrm>
+          <a:prstGeom prst="rect">
+            <a:avLst/>
+          </a:prstGeom>
+        </p:spPr>
+      </p:pic>
     </p:spTree>
     <p:extLst>
       <p:ext uri="{BB962C8B-B14F-4D97-AF65-F5344CB8AC3E}">

</xml_diff>